<commit_message>
Add 'steps' for creating HTML layour - part 3
</commit_message>
<xml_diff>
--- a/presentations/FAC9 Workshop.pptx
+++ b/presentations/FAC9 Workshop.pptx
@@ -5,7 +5,7 @@
     <p:sldMasterId id="2147483648" r:id="rId1"/>
   </p:sldMasterIdLst>
   <p:notesMasterIdLst>
-    <p:notesMasterId r:id="rId44"/>
+    <p:notesMasterId r:id="rId46"/>
   </p:notesMasterIdLst>
   <p:sldIdLst>
     <p:sldId id="256" r:id="rId2"/>
@@ -39,17 +39,19 @@
     <p:sldId id="296" r:id="rId30"/>
     <p:sldId id="303" r:id="rId31"/>
     <p:sldId id="304" r:id="rId32"/>
-    <p:sldId id="269" r:id="rId33"/>
-    <p:sldId id="277" r:id="rId34"/>
-    <p:sldId id="297" r:id="rId35"/>
-    <p:sldId id="298" r:id="rId36"/>
-    <p:sldId id="299" r:id="rId37"/>
-    <p:sldId id="270" r:id="rId38"/>
-    <p:sldId id="271" r:id="rId39"/>
-    <p:sldId id="272" r:id="rId40"/>
-    <p:sldId id="281" r:id="rId41"/>
-    <p:sldId id="282" r:id="rId42"/>
-    <p:sldId id="283" r:id="rId43"/>
+    <p:sldId id="305" r:id="rId33"/>
+    <p:sldId id="306" r:id="rId34"/>
+    <p:sldId id="269" r:id="rId35"/>
+    <p:sldId id="277" r:id="rId36"/>
+    <p:sldId id="297" r:id="rId37"/>
+    <p:sldId id="298" r:id="rId38"/>
+    <p:sldId id="299" r:id="rId39"/>
+    <p:sldId id="270" r:id="rId40"/>
+    <p:sldId id="271" r:id="rId41"/>
+    <p:sldId id="272" r:id="rId42"/>
+    <p:sldId id="281" r:id="rId43"/>
+    <p:sldId id="282" r:id="rId44"/>
+    <p:sldId id="283" r:id="rId45"/>
   </p:sldIdLst>
   <p:sldSz cx="12192000" cy="6858000"/>
   <p:notesSz cx="6858000" cy="9144000"/>
@@ -12643,6 +12645,797 @@
           <a:p>
             <a:r>
               <a:rPr lang="en-US" dirty="0" smtClean="0"/>
+              <a:t>3. Steps to start/end calls</a:t>
+            </a:r>
+            <a:endParaRPr lang="en-US" dirty="0"/>
+          </a:p>
+        </p:txBody>
+      </p:sp>
+      <p:sp>
+        <p:nvSpPr>
+          <p:cNvPr id="3" name="Content Placeholder 2"/>
+          <p:cNvSpPr>
+            <a:spLocks noGrp="1"/>
+          </p:cNvSpPr>
+          <p:nvPr>
+            <p:ph idx="1"/>
+          </p:nvPr>
+        </p:nvSpPr>
+        <p:spPr/>
+        <p:txBody>
+          <a:bodyPr>
+            <a:normAutofit lnSpcReduction="10000"/>
+          </a:bodyPr>
+          <a:lstStyle/>
+          <a:p>
+            <a:pPr marL="514350" indent="-514350">
+              <a:buFont typeface="+mj-lt"/>
+              <a:buAutoNum type="arabicPeriod"/>
+            </a:pPr>
+            <a:r>
+              <a:rPr lang="en-US" dirty="0" smtClean="0"/>
+              <a:t>Write HTML for 4 ‘virtual’ callers</a:t>
+            </a:r>
+          </a:p>
+          <a:p>
+            <a:pPr lvl="1"/>
+            <a:r>
+              <a:rPr lang="en-US" dirty="0" smtClean="0"/>
+              <a:t>4 video tags showing person called + 4 small video tags showing local video</a:t>
+            </a:r>
+          </a:p>
+          <a:p>
+            <a:pPr lvl="1"/>
+            <a:r>
+              <a:rPr lang="en-US" dirty="0" smtClean="0"/>
+              <a:t>&lt;input type=“text’&gt; to enter the name of the person to call</a:t>
+            </a:r>
+          </a:p>
+          <a:p>
+            <a:pPr lvl="1"/>
+            <a:r>
+              <a:rPr lang="en-US" dirty="0" smtClean="0"/>
+              <a:t>Display the current state (in HTML)</a:t>
+            </a:r>
+          </a:p>
+          <a:p>
+            <a:pPr marL="514350" indent="-514350">
+              <a:buFont typeface="+mj-lt"/>
+              <a:buAutoNum type="arabicPeriod"/>
+            </a:pPr>
+            <a:r>
+              <a:rPr lang="en-US" dirty="0" smtClean="0"/>
+              <a:t>Add ‘click’ event handlers for ‘call’ and ‘</a:t>
+            </a:r>
+            <a:r>
+              <a:rPr lang="en-US" dirty="0" err="1" smtClean="0"/>
+              <a:t>hangup</a:t>
+            </a:r>
+            <a:r>
+              <a:rPr lang="en-US" dirty="0" smtClean="0"/>
+              <a:t>’</a:t>
+            </a:r>
+          </a:p>
+          <a:p>
+            <a:pPr lvl="1"/>
+            <a:r>
+              <a:rPr lang="en-US" dirty="0" smtClean="0"/>
+              <a:t>Add these into ‘</a:t>
+            </a:r>
+            <a:r>
+              <a:rPr lang="en-US" dirty="0" err="1" smtClean="0"/>
+              <a:t>driver.js</a:t>
+            </a:r>
+            <a:r>
+              <a:rPr lang="en-US" dirty="0" smtClean="0"/>
+              <a:t>’</a:t>
+            </a:r>
+          </a:p>
+          <a:p>
+            <a:pPr marL="514350" indent="-514350">
+              <a:buFont typeface="+mj-lt"/>
+              <a:buAutoNum type="arabicPeriod"/>
+            </a:pPr>
+            <a:r>
+              <a:rPr lang="en-US" dirty="0" smtClean="0"/>
+              <a:t>For each caller, create a </a:t>
+            </a:r>
+            <a:r>
+              <a:rPr lang="en-US" dirty="0" err="1" smtClean="0"/>
+              <a:t>VirtualEndPoint</a:t>
+            </a:r>
+            <a:r>
+              <a:rPr lang="en-US" dirty="0" smtClean="0"/>
+              <a:t> object</a:t>
+            </a:r>
+          </a:p>
+          <a:p>
+            <a:pPr lvl="1"/>
+            <a:r>
+              <a:rPr lang="en-US" dirty="0" smtClean="0"/>
+              <a:t>Pass in the video tags and the ‘status’ display tag to the constructor</a:t>
+            </a:r>
+            <a:br>
+              <a:rPr lang="en-US" dirty="0" smtClean="0"/>
+            </a:br>
+            <a:r>
+              <a:rPr lang="en-US" dirty="0" smtClean="0"/>
+              <a:t/>
+            </a:r>
+            <a:br>
+              <a:rPr lang="en-US" dirty="0" smtClean="0"/>
+            </a:br>
+            <a:r>
+              <a:rPr lang="en-US" sz="1800" dirty="0" smtClean="0">
+                <a:latin typeface="Courier New" charset="0"/>
+                <a:ea typeface="Courier New" charset="0"/>
+                <a:cs typeface="Courier New" charset="0"/>
+              </a:rPr>
+              <a:t>new </a:t>
+            </a:r>
+            <a:r>
+              <a:rPr lang="en-US" sz="1800" dirty="0" err="1" smtClean="0">
+                <a:latin typeface="Courier New" charset="0"/>
+                <a:ea typeface="Courier New" charset="0"/>
+                <a:cs typeface="Courier New" charset="0"/>
+              </a:rPr>
+              <a:t>VideoEndPoint</a:t>
+            </a:r>
+            <a:r>
+              <a:rPr lang="en-US" sz="1800" dirty="0" smtClean="0">
+                <a:latin typeface="Courier New" charset="0"/>
+                <a:ea typeface="Courier New" charset="0"/>
+                <a:cs typeface="Courier New" charset="0"/>
+              </a:rPr>
+              <a:t>(</a:t>
+            </a:r>
+            <a:br>
+              <a:rPr lang="en-US" sz="1800" dirty="0" smtClean="0">
+                <a:latin typeface="Courier New" charset="0"/>
+                <a:ea typeface="Courier New" charset="0"/>
+                <a:cs typeface="Courier New" charset="0"/>
+              </a:rPr>
+            </a:br>
+            <a:r>
+              <a:rPr lang="en-US" sz="1800" dirty="0" smtClean="0">
+                <a:latin typeface="Courier New" charset="0"/>
+                <a:ea typeface="Courier New" charset="0"/>
+                <a:cs typeface="Courier New" charset="0"/>
+              </a:rPr>
+              <a:t>    ‘name’,</a:t>
+            </a:r>
+            <a:r>
+              <a:rPr lang="en-US" sz="1800" dirty="0" err="1" smtClean="0">
+                <a:latin typeface="Courier New" charset="0"/>
+                <a:ea typeface="Courier New" charset="0"/>
+                <a:cs typeface="Courier New" charset="0"/>
+              </a:rPr>
+              <a:t>remoteVideoDOMtag</a:t>
+            </a:r>
+            <a:r>
+              <a:rPr lang="en-US" sz="1800" dirty="0" smtClean="0">
+                <a:latin typeface="Courier New" charset="0"/>
+                <a:ea typeface="Courier New" charset="0"/>
+                <a:cs typeface="Courier New" charset="0"/>
+              </a:rPr>
+              <a:t>,</a:t>
+            </a:r>
+            <a:r>
+              <a:rPr lang="en-US" sz="1800" dirty="0">
+                <a:latin typeface="Courier New" charset="0"/>
+                <a:ea typeface="Courier New" charset="0"/>
+                <a:cs typeface="Courier New" charset="0"/>
+              </a:rPr>
+              <a:t> </a:t>
+            </a:r>
+            <a:r>
+              <a:rPr lang="en-US" sz="1800" dirty="0" err="1" smtClean="0">
+                <a:latin typeface="Courier New" charset="0"/>
+                <a:ea typeface="Courier New" charset="0"/>
+                <a:cs typeface="Courier New" charset="0"/>
+              </a:rPr>
+              <a:t>remoteVideoDOMtag</a:t>
+            </a:r>
+            <a:r>
+              <a:rPr lang="en-US" sz="1800" dirty="0" smtClean="0">
+                <a:latin typeface="Courier New" charset="0"/>
+                <a:ea typeface="Courier New" charset="0"/>
+                <a:cs typeface="Courier New" charset="0"/>
+              </a:rPr>
+              <a:t>, </a:t>
+            </a:r>
+            <a:r>
+              <a:rPr lang="en-US" sz="1800" dirty="0" err="1" smtClean="0">
+                <a:latin typeface="Courier New" charset="0"/>
+                <a:ea typeface="Courier New" charset="0"/>
+                <a:cs typeface="Courier New" charset="0"/>
+              </a:rPr>
+              <a:t>statusDOMtag</a:t>
+            </a:r>
+            <a:r>
+              <a:rPr lang="en-US" sz="1800" dirty="0" smtClean="0">
+                <a:latin typeface="Courier New" charset="0"/>
+                <a:ea typeface="Courier New" charset="0"/>
+                <a:cs typeface="Courier New" charset="0"/>
+              </a:rPr>
+              <a:t/>
+            </a:r>
+            <a:br>
+              <a:rPr lang="en-US" sz="1800" dirty="0" smtClean="0">
+                <a:latin typeface="Courier New" charset="0"/>
+                <a:ea typeface="Courier New" charset="0"/>
+                <a:cs typeface="Courier New" charset="0"/>
+              </a:rPr>
+            </a:br>
+            <a:r>
+              <a:rPr lang="en-US" sz="1800" dirty="0" smtClean="0">
+                <a:latin typeface="Courier New" charset="0"/>
+                <a:ea typeface="Courier New" charset="0"/>
+                <a:cs typeface="Courier New" charset="0"/>
+              </a:rPr>
+              <a:t>)</a:t>
+            </a:r>
+            <a:endParaRPr lang="en-US" dirty="0" smtClean="0">
+              <a:latin typeface="Courier New" charset="0"/>
+              <a:ea typeface="Courier New" charset="0"/>
+              <a:cs typeface="Courier New" charset="0"/>
+            </a:endParaRPr>
+          </a:p>
+          <a:p>
+            <a:pPr lvl="1"/>
+            <a:endParaRPr lang="en-US" dirty="0"/>
+          </a:p>
+        </p:txBody>
+      </p:sp>
+    </p:spTree>
+    <p:extLst>
+      <p:ext uri="{BB962C8B-B14F-4D97-AF65-F5344CB8AC3E}">
+        <p14:creationId xmlns:p14="http://schemas.microsoft.com/office/powerpoint/2010/main" val="1417700207"/>
+      </p:ext>
+    </p:extLst>
+  </p:cSld>
+  <p:clrMapOvr>
+    <a:masterClrMapping/>
+  </p:clrMapOvr>
+</p:sld>
+</file>
+
+<file path=ppt/slides/slide33.xml><?xml version="1.0" encoding="utf-8"?>
+<p:sld xmlns:a="http://schemas.openxmlformats.org/drawingml/2006/main" xmlns:r="http://schemas.openxmlformats.org/officeDocument/2006/relationships" xmlns:p="http://schemas.openxmlformats.org/presentationml/2006/main">
+  <p:cSld>
+    <p:spTree>
+      <p:nvGrpSpPr>
+        <p:cNvPr id="1" name=""/>
+        <p:cNvGrpSpPr/>
+        <p:nvPr/>
+      </p:nvGrpSpPr>
+      <p:grpSpPr>
+        <a:xfrm>
+          <a:off x="0" y="0"/>
+          <a:ext cx="0" cy="0"/>
+          <a:chOff x="0" y="0"/>
+          <a:chExt cx="0" cy="0"/>
+        </a:xfrm>
+      </p:grpSpPr>
+      <p:sp>
+        <p:nvSpPr>
+          <p:cNvPr id="2" name="Title 1"/>
+          <p:cNvSpPr>
+            <a:spLocks noGrp="1"/>
+          </p:cNvSpPr>
+          <p:nvPr>
+            <p:ph type="title"/>
+          </p:nvPr>
+        </p:nvSpPr>
+        <p:spPr/>
+        <p:txBody>
+          <a:bodyPr/>
+          <a:lstStyle/>
+          <a:p>
+            <a:r>
+              <a:rPr lang="en-US" smtClean="0"/>
+              <a:t>Responsive HTML layout</a:t>
+            </a:r>
+            <a:endParaRPr lang="en-US"/>
+          </a:p>
+        </p:txBody>
+      </p:sp>
+      <p:sp>
+        <p:nvSpPr>
+          <p:cNvPr id="3" name="Content Placeholder 2"/>
+          <p:cNvSpPr>
+            <a:spLocks noGrp="1"/>
+          </p:cNvSpPr>
+          <p:nvPr>
+            <p:ph idx="1"/>
+          </p:nvPr>
+        </p:nvSpPr>
+        <p:spPr/>
+        <p:txBody>
+          <a:bodyPr>
+            <a:normAutofit fontScale="77500" lnSpcReduction="20000"/>
+          </a:bodyPr>
+          <a:lstStyle/>
+          <a:p>
+            <a:r>
+              <a:rPr lang="en-US" dirty="0" smtClean="0">
+                <a:latin typeface="Courier New" charset="0"/>
+                <a:ea typeface="Courier New" charset="0"/>
+                <a:cs typeface="Courier New" charset="0"/>
+              </a:rPr>
+              <a:t>&lt;div class=”container”&gt;</a:t>
+            </a:r>
+            <a:br>
+              <a:rPr lang="en-US" dirty="0" smtClean="0">
+                <a:latin typeface="Courier New" charset="0"/>
+                <a:ea typeface="Courier New" charset="0"/>
+                <a:cs typeface="Courier New" charset="0"/>
+              </a:rPr>
+            </a:br>
+            <a:r>
+              <a:rPr lang="en-US" dirty="0" smtClean="0">
+                <a:latin typeface="Courier New" charset="0"/>
+                <a:ea typeface="Courier New" charset="0"/>
+                <a:cs typeface="Courier New" charset="0"/>
+              </a:rPr>
+              <a:t>  &lt;div class=“row”&gt;</a:t>
+            </a:r>
+            <a:r>
+              <a:rPr lang="en-US" dirty="0">
+                <a:latin typeface="Courier New" charset="0"/>
+                <a:ea typeface="Courier New" charset="0"/>
+                <a:cs typeface="Courier New" charset="0"/>
+              </a:rPr>
+              <a:t/>
+            </a:r>
+            <a:br>
+              <a:rPr lang="en-US" dirty="0">
+                <a:latin typeface="Courier New" charset="0"/>
+                <a:ea typeface="Courier New" charset="0"/>
+                <a:cs typeface="Courier New" charset="0"/>
+              </a:rPr>
+            </a:br>
+            <a:r>
+              <a:rPr lang="en-US" dirty="0" smtClean="0">
+                <a:latin typeface="Courier New" charset="0"/>
+                <a:ea typeface="Courier New" charset="0"/>
+                <a:cs typeface="Courier New" charset="0"/>
+              </a:rPr>
+              <a:t>    &lt;div class=”col-xs-12 col-sm-6”&gt;</a:t>
+            </a:r>
+            <a:br>
+              <a:rPr lang="en-US" dirty="0" smtClean="0">
+                <a:latin typeface="Courier New" charset="0"/>
+                <a:ea typeface="Courier New" charset="0"/>
+                <a:cs typeface="Courier New" charset="0"/>
+              </a:rPr>
+            </a:br>
+            <a:r>
+              <a:rPr lang="en-US" dirty="0" smtClean="0">
+                <a:latin typeface="Courier New" charset="0"/>
+                <a:ea typeface="Courier New" charset="0"/>
+                <a:cs typeface="Courier New" charset="0"/>
+              </a:rPr>
+              <a:t>      </a:t>
+            </a:r>
+            <a:r>
+              <a:rPr lang="mr-IN" dirty="0" smtClean="0">
+                <a:latin typeface="Courier New" charset="0"/>
+                <a:ea typeface="Courier New" charset="0"/>
+                <a:cs typeface="Courier New" charset="0"/>
+              </a:rPr>
+              <a:t>…</a:t>
+            </a:r>
+            <a:r>
+              <a:rPr lang="en-GB" dirty="0" smtClean="0">
+                <a:latin typeface="Courier New" charset="0"/>
+                <a:ea typeface="Courier New" charset="0"/>
+                <a:cs typeface="Courier New" charset="0"/>
+              </a:rPr>
+              <a:t/>
+            </a:r>
+            <a:br>
+              <a:rPr lang="en-GB" dirty="0" smtClean="0">
+                <a:latin typeface="Courier New" charset="0"/>
+                <a:ea typeface="Courier New" charset="0"/>
+                <a:cs typeface="Courier New" charset="0"/>
+              </a:rPr>
+            </a:br>
+            <a:r>
+              <a:rPr lang="en-GB" dirty="0" smtClean="0">
+                <a:latin typeface="Courier New" charset="0"/>
+                <a:ea typeface="Courier New" charset="0"/>
+                <a:cs typeface="Courier New" charset="0"/>
+              </a:rPr>
+              <a:t>    &lt;/div&gt;</a:t>
+            </a:r>
+            <a:br>
+              <a:rPr lang="en-GB" dirty="0" smtClean="0">
+                <a:latin typeface="Courier New" charset="0"/>
+                <a:ea typeface="Courier New" charset="0"/>
+                <a:cs typeface="Courier New" charset="0"/>
+              </a:rPr>
+            </a:br>
+            <a:r>
+              <a:rPr lang="en-GB" dirty="0" smtClean="0">
+                <a:latin typeface="Courier New" charset="0"/>
+                <a:ea typeface="Courier New" charset="0"/>
+                <a:cs typeface="Courier New" charset="0"/>
+              </a:rPr>
+              <a:t>   </a:t>
+            </a:r>
+            <a:r>
+              <a:rPr lang="en-US" dirty="0" smtClean="0">
+                <a:latin typeface="Courier New" charset="0"/>
+                <a:ea typeface="Courier New" charset="0"/>
+                <a:cs typeface="Courier New" charset="0"/>
+              </a:rPr>
+              <a:t> </a:t>
+            </a:r>
+            <a:r>
+              <a:rPr lang="en-US" dirty="0">
+                <a:latin typeface="Courier New" charset="0"/>
+                <a:ea typeface="Courier New" charset="0"/>
+                <a:cs typeface="Courier New" charset="0"/>
+              </a:rPr>
+              <a:t>&lt;div class=”</a:t>
+            </a:r>
+            <a:r>
+              <a:rPr lang="en-US" dirty="0" smtClean="0">
+                <a:latin typeface="Courier New" charset="0"/>
+                <a:ea typeface="Courier New" charset="0"/>
+                <a:cs typeface="Courier New" charset="0"/>
+              </a:rPr>
+              <a:t>col-xs-12</a:t>
+            </a:r>
+            <a:r>
+              <a:rPr lang="en-US" dirty="0">
+                <a:latin typeface="Courier New" charset="0"/>
+                <a:ea typeface="Courier New" charset="0"/>
+                <a:cs typeface="Courier New" charset="0"/>
+              </a:rPr>
+              <a:t> </a:t>
+            </a:r>
+            <a:r>
+              <a:rPr lang="en-US" dirty="0" smtClean="0">
+                <a:latin typeface="Courier New" charset="0"/>
+                <a:ea typeface="Courier New" charset="0"/>
+                <a:cs typeface="Courier New" charset="0"/>
+              </a:rPr>
+              <a:t>col-sm-6”&gt;</a:t>
+            </a:r>
+            <a:r>
+              <a:rPr lang="en-US" dirty="0">
+                <a:latin typeface="Courier New" charset="0"/>
+                <a:ea typeface="Courier New" charset="0"/>
+                <a:cs typeface="Courier New" charset="0"/>
+              </a:rPr>
+              <a:t/>
+            </a:r>
+            <a:br>
+              <a:rPr lang="en-US" dirty="0">
+                <a:latin typeface="Courier New" charset="0"/>
+                <a:ea typeface="Courier New" charset="0"/>
+                <a:cs typeface="Courier New" charset="0"/>
+              </a:rPr>
+            </a:br>
+            <a:r>
+              <a:rPr lang="en-US" dirty="0">
+                <a:latin typeface="Courier New" charset="0"/>
+                <a:ea typeface="Courier New" charset="0"/>
+                <a:cs typeface="Courier New" charset="0"/>
+              </a:rPr>
+              <a:t>      </a:t>
+            </a:r>
+            <a:r>
+              <a:rPr lang="mr-IN" dirty="0">
+                <a:latin typeface="Courier New" charset="0"/>
+                <a:ea typeface="Courier New" charset="0"/>
+                <a:cs typeface="Courier New" charset="0"/>
+              </a:rPr>
+              <a:t>…</a:t>
+            </a:r>
+            <a:r>
+              <a:rPr lang="en-GB" dirty="0">
+                <a:latin typeface="Courier New" charset="0"/>
+                <a:ea typeface="Courier New" charset="0"/>
+                <a:cs typeface="Courier New" charset="0"/>
+              </a:rPr>
+              <a:t/>
+            </a:r>
+            <a:br>
+              <a:rPr lang="en-GB" dirty="0">
+                <a:latin typeface="Courier New" charset="0"/>
+                <a:ea typeface="Courier New" charset="0"/>
+                <a:cs typeface="Courier New" charset="0"/>
+              </a:rPr>
+            </a:br>
+            <a:r>
+              <a:rPr lang="en-GB" dirty="0">
+                <a:latin typeface="Courier New" charset="0"/>
+                <a:ea typeface="Courier New" charset="0"/>
+                <a:cs typeface="Courier New" charset="0"/>
+              </a:rPr>
+              <a:t>    &lt;/div&gt;</a:t>
+            </a:r>
+            <a:br>
+              <a:rPr lang="en-GB" dirty="0">
+                <a:latin typeface="Courier New" charset="0"/>
+                <a:ea typeface="Courier New" charset="0"/>
+                <a:cs typeface="Courier New" charset="0"/>
+              </a:rPr>
+            </a:br>
+            <a:r>
+              <a:rPr lang="en-GB" dirty="0" smtClean="0">
+                <a:latin typeface="Courier New" charset="0"/>
+                <a:ea typeface="Courier New" charset="0"/>
+                <a:cs typeface="Courier New" charset="0"/>
+              </a:rPr>
+              <a:t>   </a:t>
+            </a:r>
+            <a:r>
+              <a:rPr lang="en-US" dirty="0" smtClean="0">
+                <a:latin typeface="Courier New" charset="0"/>
+                <a:ea typeface="Courier New" charset="0"/>
+                <a:cs typeface="Courier New" charset="0"/>
+              </a:rPr>
+              <a:t> </a:t>
+            </a:r>
+            <a:r>
+              <a:rPr lang="en-US" dirty="0">
+                <a:latin typeface="Courier New" charset="0"/>
+                <a:ea typeface="Courier New" charset="0"/>
+                <a:cs typeface="Courier New" charset="0"/>
+              </a:rPr>
+              <a:t>&lt;div class=”col-xs-12 </a:t>
+            </a:r>
+            <a:r>
+              <a:rPr lang="en-US" dirty="0" smtClean="0">
+                <a:latin typeface="Courier New" charset="0"/>
+                <a:ea typeface="Courier New" charset="0"/>
+                <a:cs typeface="Courier New" charset="0"/>
+              </a:rPr>
+              <a:t>col-sm-6</a:t>
+            </a:r>
+            <a:r>
+              <a:rPr lang="en-US" dirty="0">
+                <a:latin typeface="Courier New" charset="0"/>
+                <a:ea typeface="Courier New" charset="0"/>
+                <a:cs typeface="Courier New" charset="0"/>
+              </a:rPr>
+              <a:t>”&gt;</a:t>
+            </a:r>
+            <a:br>
+              <a:rPr lang="en-US" dirty="0">
+                <a:latin typeface="Courier New" charset="0"/>
+                <a:ea typeface="Courier New" charset="0"/>
+                <a:cs typeface="Courier New" charset="0"/>
+              </a:rPr>
+            </a:br>
+            <a:r>
+              <a:rPr lang="en-US" dirty="0">
+                <a:latin typeface="Courier New" charset="0"/>
+                <a:ea typeface="Courier New" charset="0"/>
+                <a:cs typeface="Courier New" charset="0"/>
+              </a:rPr>
+              <a:t>      </a:t>
+            </a:r>
+            <a:r>
+              <a:rPr lang="mr-IN" dirty="0">
+                <a:latin typeface="Courier New" charset="0"/>
+                <a:ea typeface="Courier New" charset="0"/>
+                <a:cs typeface="Courier New" charset="0"/>
+              </a:rPr>
+              <a:t>…</a:t>
+            </a:r>
+            <a:r>
+              <a:rPr lang="en-GB" dirty="0">
+                <a:latin typeface="Courier New" charset="0"/>
+                <a:ea typeface="Courier New" charset="0"/>
+                <a:cs typeface="Courier New" charset="0"/>
+              </a:rPr>
+              <a:t/>
+            </a:r>
+            <a:br>
+              <a:rPr lang="en-GB" dirty="0">
+                <a:latin typeface="Courier New" charset="0"/>
+                <a:ea typeface="Courier New" charset="0"/>
+                <a:cs typeface="Courier New" charset="0"/>
+              </a:rPr>
+            </a:br>
+            <a:r>
+              <a:rPr lang="en-GB" dirty="0">
+                <a:latin typeface="Courier New" charset="0"/>
+                <a:ea typeface="Courier New" charset="0"/>
+                <a:cs typeface="Courier New" charset="0"/>
+              </a:rPr>
+              <a:t>    &lt;/div&gt;</a:t>
+            </a:r>
+            <a:br>
+              <a:rPr lang="en-GB" dirty="0">
+                <a:latin typeface="Courier New" charset="0"/>
+                <a:ea typeface="Courier New" charset="0"/>
+                <a:cs typeface="Courier New" charset="0"/>
+              </a:rPr>
+            </a:br>
+            <a:r>
+              <a:rPr lang="en-GB" dirty="0" smtClean="0">
+                <a:latin typeface="Courier New" charset="0"/>
+                <a:ea typeface="Courier New" charset="0"/>
+                <a:cs typeface="Courier New" charset="0"/>
+              </a:rPr>
+              <a:t>   </a:t>
+            </a:r>
+            <a:r>
+              <a:rPr lang="en-US" dirty="0" smtClean="0">
+                <a:latin typeface="Courier New" charset="0"/>
+                <a:ea typeface="Courier New" charset="0"/>
+                <a:cs typeface="Courier New" charset="0"/>
+              </a:rPr>
+              <a:t> </a:t>
+            </a:r>
+            <a:r>
+              <a:rPr lang="en-US" dirty="0">
+                <a:latin typeface="Courier New" charset="0"/>
+                <a:ea typeface="Courier New" charset="0"/>
+                <a:cs typeface="Courier New" charset="0"/>
+              </a:rPr>
+              <a:t>&lt;div class=”col-xs-12 </a:t>
+            </a:r>
+            <a:r>
+              <a:rPr lang="en-US" dirty="0" smtClean="0">
+                <a:latin typeface="Courier New" charset="0"/>
+                <a:ea typeface="Courier New" charset="0"/>
+                <a:cs typeface="Courier New" charset="0"/>
+              </a:rPr>
+              <a:t>col-sm-6</a:t>
+            </a:r>
+            <a:r>
+              <a:rPr lang="en-US" dirty="0">
+                <a:latin typeface="Courier New" charset="0"/>
+                <a:ea typeface="Courier New" charset="0"/>
+                <a:cs typeface="Courier New" charset="0"/>
+              </a:rPr>
+              <a:t>”&gt;</a:t>
+            </a:r>
+            <a:br>
+              <a:rPr lang="en-US" dirty="0">
+                <a:latin typeface="Courier New" charset="0"/>
+                <a:ea typeface="Courier New" charset="0"/>
+                <a:cs typeface="Courier New" charset="0"/>
+              </a:rPr>
+            </a:br>
+            <a:r>
+              <a:rPr lang="en-US" dirty="0">
+                <a:latin typeface="Courier New" charset="0"/>
+                <a:ea typeface="Courier New" charset="0"/>
+                <a:cs typeface="Courier New" charset="0"/>
+              </a:rPr>
+              <a:t>      </a:t>
+            </a:r>
+            <a:r>
+              <a:rPr lang="mr-IN" dirty="0">
+                <a:latin typeface="Courier New" charset="0"/>
+                <a:ea typeface="Courier New" charset="0"/>
+                <a:cs typeface="Courier New" charset="0"/>
+              </a:rPr>
+              <a:t>…</a:t>
+            </a:r>
+            <a:r>
+              <a:rPr lang="en-GB" dirty="0">
+                <a:latin typeface="Courier New" charset="0"/>
+                <a:ea typeface="Courier New" charset="0"/>
+                <a:cs typeface="Courier New" charset="0"/>
+              </a:rPr>
+              <a:t/>
+            </a:r>
+            <a:br>
+              <a:rPr lang="en-GB" dirty="0">
+                <a:latin typeface="Courier New" charset="0"/>
+                <a:ea typeface="Courier New" charset="0"/>
+                <a:cs typeface="Courier New" charset="0"/>
+              </a:rPr>
+            </a:br>
+            <a:r>
+              <a:rPr lang="en-GB" dirty="0">
+                <a:latin typeface="Courier New" charset="0"/>
+                <a:ea typeface="Courier New" charset="0"/>
+                <a:cs typeface="Courier New" charset="0"/>
+              </a:rPr>
+              <a:t>    &lt;/div&gt;</a:t>
+            </a:r>
+            <a:br>
+              <a:rPr lang="en-GB" dirty="0">
+                <a:latin typeface="Courier New" charset="0"/>
+                <a:ea typeface="Courier New" charset="0"/>
+                <a:cs typeface="Courier New" charset="0"/>
+              </a:rPr>
+            </a:br>
+            <a:r>
+              <a:rPr lang="en-GB" dirty="0" smtClean="0">
+                <a:latin typeface="Courier New" charset="0"/>
+                <a:ea typeface="Courier New" charset="0"/>
+                <a:cs typeface="Courier New" charset="0"/>
+              </a:rPr>
+              <a:t> &lt;/div&gt;</a:t>
+            </a:r>
+            <a:br>
+              <a:rPr lang="en-GB" dirty="0" smtClean="0">
+                <a:latin typeface="Courier New" charset="0"/>
+                <a:ea typeface="Courier New" charset="0"/>
+                <a:cs typeface="Courier New" charset="0"/>
+              </a:rPr>
+            </a:br>
+            <a:r>
+              <a:rPr lang="en-GB" dirty="0" smtClean="0">
+                <a:latin typeface="Courier New" charset="0"/>
+                <a:ea typeface="Courier New" charset="0"/>
+                <a:cs typeface="Courier New" charset="0"/>
+              </a:rPr>
+              <a:t>&lt;div&gt;</a:t>
+            </a:r>
+            <a:br>
+              <a:rPr lang="en-GB" dirty="0" smtClean="0">
+                <a:latin typeface="Courier New" charset="0"/>
+                <a:ea typeface="Courier New" charset="0"/>
+                <a:cs typeface="Courier New" charset="0"/>
+              </a:rPr>
+            </a:br>
+            <a:endParaRPr lang="en-US" dirty="0" smtClean="0">
+              <a:latin typeface="Courier New" charset="0"/>
+              <a:ea typeface="Courier New" charset="0"/>
+              <a:cs typeface="Courier New" charset="0"/>
+            </a:endParaRPr>
+          </a:p>
+        </p:txBody>
+      </p:sp>
+    </p:spTree>
+    <p:extLst>
+      <p:ext uri="{BB962C8B-B14F-4D97-AF65-F5344CB8AC3E}">
+        <p14:creationId xmlns:p14="http://schemas.microsoft.com/office/powerpoint/2010/main" val="1644456374"/>
+      </p:ext>
+    </p:extLst>
+  </p:cSld>
+  <p:clrMapOvr>
+    <a:masterClrMapping/>
+  </p:clrMapOvr>
+</p:sld>
+</file>
+
+<file path=ppt/slides/slide34.xml><?xml version="1.0" encoding="utf-8"?>
+<p:sld xmlns:a="http://schemas.openxmlformats.org/drawingml/2006/main" xmlns:r="http://schemas.openxmlformats.org/officeDocument/2006/relationships" xmlns:p="http://schemas.openxmlformats.org/presentationml/2006/main">
+  <p:cSld>
+    <p:spTree>
+      <p:nvGrpSpPr>
+        <p:cNvPr id="1" name=""/>
+        <p:cNvGrpSpPr/>
+        <p:nvPr/>
+      </p:nvGrpSpPr>
+      <p:grpSpPr>
+        <a:xfrm>
+          <a:off x="0" y="0"/>
+          <a:ext cx="0" cy="0"/>
+          <a:chOff x="0" y="0"/>
+          <a:chExt cx="0" cy="0"/>
+        </a:xfrm>
+      </p:grpSpPr>
+      <p:sp>
+        <p:nvSpPr>
+          <p:cNvPr id="2" name="Title 1"/>
+          <p:cNvSpPr>
+            <a:spLocks noGrp="1"/>
+          </p:cNvSpPr>
+          <p:nvPr>
+            <p:ph type="title"/>
+          </p:nvPr>
+        </p:nvSpPr>
+        <p:spPr/>
+        <p:txBody>
+          <a:bodyPr/>
+          <a:lstStyle/>
+          <a:p>
+            <a:r>
+              <a:rPr lang="en-US" dirty="0" smtClean="0"/>
               <a:t>4. Remote Peer Connections</a:t>
             </a:r>
             <a:endParaRPr lang="en-US" dirty="0"/>
@@ -13257,7 +14050,7 @@
 </p:sld>
 </file>
 
-<file path=ppt/slides/slide33.xml><?xml version="1.0" encoding="utf-8"?>
+<file path=ppt/slides/slide35.xml><?xml version="1.0" encoding="utf-8"?>
 <p:sld xmlns:a="http://schemas.openxmlformats.org/drawingml/2006/main" xmlns:r="http://schemas.openxmlformats.org/officeDocument/2006/relationships" xmlns:p="http://schemas.openxmlformats.org/presentationml/2006/main">
   <p:cSld>
     <p:spTree>
@@ -13741,7 +14534,7 @@
 </p:sld>
 </file>
 
-<file path=ppt/slides/slide34.xml><?xml version="1.0" encoding="utf-8"?>
+<file path=ppt/slides/slide36.xml><?xml version="1.0" encoding="utf-8"?>
 <p:sld xmlns:a="http://schemas.openxmlformats.org/drawingml/2006/main" xmlns:r="http://schemas.openxmlformats.org/officeDocument/2006/relationships" xmlns:p="http://schemas.openxmlformats.org/presentationml/2006/main">
   <p:cSld>
     <p:spTree>
@@ -13881,7 +14674,7 @@
 </p:sld>
 </file>
 
-<file path=ppt/slides/slide35.xml><?xml version="1.0" encoding="utf-8"?>
+<file path=ppt/slides/slide37.xml><?xml version="1.0" encoding="utf-8"?>
 <p:sld xmlns:a="http://schemas.openxmlformats.org/drawingml/2006/main" xmlns:r="http://schemas.openxmlformats.org/officeDocument/2006/relationships" xmlns:p="http://schemas.openxmlformats.org/presentationml/2006/main">
   <p:cSld>
     <p:spTree>
@@ -14014,7 +14807,7 @@
 </p:sld>
 </file>
 
-<file path=ppt/slides/slide36.xml><?xml version="1.0" encoding="utf-8"?>
+<file path=ppt/slides/slide38.xml><?xml version="1.0" encoding="utf-8"?>
 <p:sld xmlns:a="http://schemas.openxmlformats.org/drawingml/2006/main" xmlns:r="http://schemas.openxmlformats.org/officeDocument/2006/relationships" xmlns:p="http://schemas.openxmlformats.org/presentationml/2006/main">
   <p:cSld>
     <p:spTree>
@@ -14776,7 +15569,7 @@
 </p:sld>
 </file>
 
-<file path=ppt/slides/slide37.xml><?xml version="1.0" encoding="utf-8"?>
+<file path=ppt/slides/slide39.xml><?xml version="1.0" encoding="utf-8"?>
 <p:sld xmlns:a="http://schemas.openxmlformats.org/drawingml/2006/main" xmlns:r="http://schemas.openxmlformats.org/officeDocument/2006/relationships" xmlns:p="http://schemas.openxmlformats.org/presentationml/2006/main">
   <p:cSld>
     <p:spTree>
@@ -15545,576 +16338,6 @@
 </p:sld>
 </file>
 
-<file path=ppt/slides/slide38.xml><?xml version="1.0" encoding="utf-8"?>
-<p:sld xmlns:a="http://schemas.openxmlformats.org/drawingml/2006/main" xmlns:r="http://schemas.openxmlformats.org/officeDocument/2006/relationships" xmlns:p="http://schemas.openxmlformats.org/presentationml/2006/main" show="0">
-  <p:cSld>
-    <p:spTree>
-      <p:nvGrpSpPr>
-        <p:cNvPr id="1" name=""/>
-        <p:cNvGrpSpPr/>
-        <p:nvPr/>
-      </p:nvGrpSpPr>
-      <p:grpSpPr>
-        <a:xfrm>
-          <a:off x="0" y="0"/>
-          <a:ext cx="0" cy="0"/>
-          <a:chOff x="0" y="0"/>
-          <a:chExt cx="0" cy="0"/>
-        </a:xfrm>
-      </p:grpSpPr>
-      <p:sp>
-        <p:nvSpPr>
-          <p:cNvPr id="2" name="Title 1"/>
-          <p:cNvSpPr>
-            <a:spLocks noGrp="1"/>
-          </p:cNvSpPr>
-          <p:nvPr>
-            <p:ph type="title"/>
-          </p:nvPr>
-        </p:nvSpPr>
-        <p:spPr/>
-        <p:txBody>
-          <a:bodyPr>
-            <a:normAutofit/>
-          </a:bodyPr>
-          <a:lstStyle/>
-          <a:p>
-            <a:r>
-              <a:rPr lang="en-US" sz="4000" dirty="0" err="1" smtClean="0"/>
-              <a:t>Signalling</a:t>
-            </a:r>
-            <a:r>
-              <a:rPr lang="en-US" sz="4000" dirty="0" smtClean="0"/>
-              <a:t> for Remote Presentations: Two Options</a:t>
-            </a:r>
-            <a:endParaRPr lang="en-US" sz="4000" dirty="0"/>
-          </a:p>
-        </p:txBody>
-      </p:sp>
-      <p:sp>
-        <p:nvSpPr>
-          <p:cNvPr id="3" name="Content Placeholder 2"/>
-          <p:cNvSpPr>
-            <a:spLocks noGrp="1"/>
-          </p:cNvSpPr>
-          <p:nvPr>
-            <p:ph idx="1"/>
-          </p:nvPr>
-        </p:nvSpPr>
-        <p:spPr/>
-        <p:txBody>
-          <a:bodyPr/>
-          <a:lstStyle/>
-          <a:p>
-            <a:r>
-              <a:rPr lang="en-US" dirty="0" smtClean="0"/>
-              <a:t>Evolution of simple </a:t>
-            </a:r>
-            <a:r>
-              <a:rPr lang="en-US" dirty="0" err="1" smtClean="0"/>
-              <a:t>signalling</a:t>
-            </a:r>
-            <a:r>
-              <a:rPr lang="en-US" dirty="0" smtClean="0"/>
-              <a:t> from previous example</a:t>
-            </a:r>
-          </a:p>
-          <a:p>
-            <a:pPr lvl="1"/>
-            <a:r>
-              <a:rPr lang="en-US" dirty="0" smtClean="0"/>
-              <a:t>Should work on a local LAN</a:t>
-            </a:r>
-          </a:p>
-          <a:p>
-            <a:pPr lvl="1"/>
-            <a:r>
-              <a:rPr lang="en-US" dirty="0" smtClean="0"/>
-              <a:t>Won’t work across the Internet without TURN/STUN servers (complexity)</a:t>
-            </a:r>
-          </a:p>
-          <a:p>
-            <a:r>
-              <a:rPr lang="en-US" dirty="0" err="1" smtClean="0"/>
-              <a:t>IPCortex</a:t>
-            </a:r>
-            <a:r>
-              <a:rPr lang="en-US" dirty="0" smtClean="0"/>
-              <a:t> API</a:t>
-            </a:r>
-          </a:p>
-          <a:p>
-            <a:pPr lvl="1"/>
-            <a:r>
-              <a:rPr lang="en-US" dirty="0" smtClean="0"/>
-              <a:t>Covers all the routing across the Internet</a:t>
-            </a:r>
-          </a:p>
-          <a:p>
-            <a:pPr lvl="1"/>
-            <a:r>
-              <a:rPr lang="en-US" dirty="0" smtClean="0"/>
-              <a:t>More complex to configure/run</a:t>
-            </a:r>
-          </a:p>
-          <a:p>
-            <a:endParaRPr lang="en-US" dirty="0"/>
-          </a:p>
-        </p:txBody>
-      </p:sp>
-    </p:spTree>
-    <p:extLst>
-      <p:ext uri="{BB962C8B-B14F-4D97-AF65-F5344CB8AC3E}">
-        <p14:creationId xmlns:p14="http://schemas.microsoft.com/office/powerpoint/2010/main" val="814445932"/>
-      </p:ext>
-    </p:extLst>
-  </p:cSld>
-  <p:clrMapOvr>
-    <a:masterClrMapping/>
-  </p:clrMapOvr>
-  <mc:AlternateContent xmlns:mc="http://schemas.openxmlformats.org/markup-compatibility/2006">
-    <mc:Choice xmlns:p14="http://schemas.microsoft.com/office/powerpoint/2010/main" Requires="p14">
-      <p:transition spd="slow" p14:dur="2000"/>
-    </mc:Choice>
-    <mc:Fallback>
-      <p:transition spd="slow"/>
-    </mc:Fallback>
-  </mc:AlternateContent>
-  <p:timing>
-    <p:tnLst>
-      <p:par>
-        <p:cTn id="1" dur="indefinite" restart="never" nodeType="tmRoot"/>
-      </p:par>
-    </p:tnLst>
-  </p:timing>
-</p:sld>
-</file>
-
-<file path=ppt/slides/slide39.xml><?xml version="1.0" encoding="utf-8"?>
-<p:sld xmlns:a="http://schemas.openxmlformats.org/drawingml/2006/main" xmlns:r="http://schemas.openxmlformats.org/officeDocument/2006/relationships" xmlns:p="http://schemas.openxmlformats.org/presentationml/2006/main">
-  <p:cSld>
-    <p:spTree>
-      <p:nvGrpSpPr>
-        <p:cNvPr id="1" name=""/>
-        <p:cNvGrpSpPr/>
-        <p:nvPr/>
-      </p:nvGrpSpPr>
-      <p:grpSpPr>
-        <a:xfrm>
-          <a:off x="0" y="0"/>
-          <a:ext cx="0" cy="0"/>
-          <a:chOff x="0" y="0"/>
-          <a:chExt cx="0" cy="0"/>
-        </a:xfrm>
-      </p:grpSpPr>
-      <p:sp>
-        <p:nvSpPr>
-          <p:cNvPr id="2" name="Title 1"/>
-          <p:cNvSpPr>
-            <a:spLocks noGrp="1"/>
-          </p:cNvSpPr>
-          <p:nvPr>
-            <p:ph type="title"/>
-          </p:nvPr>
-        </p:nvSpPr>
-        <p:spPr/>
-        <p:txBody>
-          <a:bodyPr/>
-          <a:lstStyle/>
-          <a:p>
-            <a:r>
-              <a:rPr lang="en-US" dirty="0" smtClean="0"/>
-              <a:t>References</a:t>
-            </a:r>
-            <a:endParaRPr lang="en-US" dirty="0"/>
-          </a:p>
-        </p:txBody>
-      </p:sp>
-      <p:sp>
-        <p:nvSpPr>
-          <p:cNvPr id="3" name="Content Placeholder 2"/>
-          <p:cNvSpPr>
-            <a:spLocks noGrp="1"/>
-          </p:cNvSpPr>
-          <p:nvPr>
-            <p:ph idx="1"/>
-          </p:nvPr>
-        </p:nvSpPr>
-        <p:spPr>
-          <a:xfrm>
-            <a:off x="838200" y="1409700"/>
-            <a:ext cx="10515600" cy="5168900"/>
-          </a:xfrm>
-        </p:spPr>
-        <p:txBody>
-          <a:bodyPr>
-            <a:normAutofit fontScale="92500" lnSpcReduction="10000"/>
-          </a:bodyPr>
-          <a:lstStyle/>
-          <a:p>
-            <a:r>
-              <a:rPr lang="en-US" sz="1600" dirty="0" err="1" smtClean="0"/>
-              <a:t>mediaDevices.getUserMedia</a:t>
-            </a:r>
-            <a:r>
-              <a:rPr lang="en-US" sz="1600" dirty="0" smtClean="0"/>
-              <a:t> MDN:</a:t>
-            </a:r>
-          </a:p>
-          <a:p>
-            <a:pPr lvl="1"/>
-            <a:r>
-              <a:rPr lang="en-US" sz="1500" dirty="0" smtClean="0">
-                <a:hlinkClick r:id="rId2"/>
-              </a:rPr>
-              <a:t>https</a:t>
-            </a:r>
-            <a:r>
-              <a:rPr lang="en-US" sz="1500" dirty="0">
-                <a:hlinkClick r:id="rId2"/>
-              </a:rPr>
-              <a:t>://</a:t>
-            </a:r>
-            <a:r>
-              <a:rPr lang="en-US" sz="1400" dirty="0">
-                <a:hlinkClick r:id="rId2"/>
-              </a:rPr>
-              <a:t>developer.mozilla.org/en-US/docs/Web/API/MediaDevices/getUserMedia</a:t>
-            </a:r>
-            <a:endParaRPr lang="en-US" sz="1400" dirty="0" smtClean="0"/>
-          </a:p>
-          <a:p>
-            <a:r>
-              <a:rPr lang="en-US" sz="1600" dirty="0" err="1" smtClean="0"/>
-              <a:t>WebRTC</a:t>
-            </a:r>
-            <a:endParaRPr lang="en-US" sz="1600" dirty="0"/>
-          </a:p>
-          <a:p>
-            <a:pPr lvl="1"/>
-            <a:r>
-              <a:rPr lang="en-US" sz="1400" dirty="0" smtClean="0">
-                <a:hlinkClick r:id="rId3"/>
-              </a:rPr>
-              <a:t>https://developer.mozilla.org/en-US/docs/Web/API/WebRTC_API</a:t>
-            </a:r>
-            <a:endParaRPr lang="en-US" sz="1400" dirty="0" smtClean="0"/>
-          </a:p>
-          <a:p>
-            <a:r>
-              <a:rPr lang="en-US" sz="1600" dirty="0" err="1" smtClean="0"/>
-              <a:t>WebRTC.org</a:t>
-            </a:r>
-            <a:r>
-              <a:rPr lang="en-US" sz="1600" dirty="0" smtClean="0"/>
-              <a:t> </a:t>
-            </a:r>
-            <a:r>
-              <a:rPr lang="mr-IN" sz="1600" dirty="0" smtClean="0"/>
-              <a:t>–</a:t>
-            </a:r>
-            <a:r>
-              <a:rPr lang="en-US" sz="1600" dirty="0" smtClean="0"/>
-              <a:t> Getting Started</a:t>
-            </a:r>
-          </a:p>
-          <a:p>
-            <a:pPr lvl="1"/>
-            <a:r>
-              <a:rPr lang="en-US" sz="1400" dirty="0" smtClean="0">
-                <a:hlinkClick r:id="rId4"/>
-              </a:rPr>
-              <a:t>https://</a:t>
-            </a:r>
-            <a:r>
-              <a:rPr lang="en-US" sz="1400" dirty="0" err="1" smtClean="0">
-                <a:hlinkClick r:id="rId4"/>
-              </a:rPr>
-              <a:t>webrtc.org</a:t>
-            </a:r>
-            <a:r>
-              <a:rPr lang="en-US" sz="1400" dirty="0" smtClean="0">
-                <a:hlinkClick r:id="rId4"/>
-              </a:rPr>
-              <a:t>/start/</a:t>
-            </a:r>
-            <a:endParaRPr lang="en-US" sz="1400" dirty="0" smtClean="0"/>
-          </a:p>
-          <a:p>
-            <a:r>
-              <a:rPr lang="en-US" sz="1600" dirty="0" smtClean="0"/>
-              <a:t>HTML 5 Rocks </a:t>
-            </a:r>
-            <a:r>
-              <a:rPr lang="mr-IN" sz="1600" dirty="0" smtClean="0"/>
-              <a:t>–</a:t>
-            </a:r>
-            <a:r>
-              <a:rPr lang="en-US" sz="1600" dirty="0" smtClean="0"/>
-              <a:t> Getting started with </a:t>
-            </a:r>
-            <a:r>
-              <a:rPr lang="en-US" sz="1600" dirty="0" err="1" smtClean="0"/>
-              <a:t>WebRTC</a:t>
-            </a:r>
-            <a:r>
-              <a:rPr lang="en-US" sz="1600" dirty="0" smtClean="0"/>
-              <a:t> (2012)</a:t>
-            </a:r>
-          </a:p>
-          <a:p>
-            <a:pPr lvl="1"/>
-            <a:r>
-              <a:rPr lang="en-US" sz="1400" dirty="0" smtClean="0"/>
-              <a:t>Illustrates local </a:t>
-            </a:r>
-            <a:r>
-              <a:rPr lang="en-US" sz="1400" dirty="0" err="1" smtClean="0"/>
-              <a:t>signalling</a:t>
-            </a:r>
-            <a:r>
-              <a:rPr lang="en-US" sz="1400" dirty="0" smtClean="0"/>
-              <a:t> </a:t>
-            </a:r>
-            <a:r>
-              <a:rPr lang="en-US" sz="1400" i="1" dirty="0" smtClean="0"/>
-              <a:t>but</a:t>
-            </a:r>
-            <a:r>
-              <a:rPr lang="en-US" sz="1400" dirty="0" smtClean="0"/>
-              <a:t> not is a portable way</a:t>
-            </a:r>
-          </a:p>
-          <a:p>
-            <a:pPr lvl="1"/>
-            <a:r>
-              <a:rPr lang="en-US" sz="1400" dirty="0" smtClean="0">
-                <a:hlinkClick r:id="rId5"/>
-              </a:rPr>
-              <a:t>https://www.html5rocks.com/en/tutorials/webrtc/basics/</a:t>
-            </a:r>
-            <a:endParaRPr lang="en-US" sz="1400" dirty="0" smtClean="0"/>
-          </a:p>
-          <a:p>
-            <a:r>
-              <a:rPr lang="en-US" sz="1600" dirty="0" smtClean="0"/>
-              <a:t>HTML 5 Rocks </a:t>
-            </a:r>
-            <a:r>
-              <a:rPr lang="mr-IN" sz="1600" dirty="0" smtClean="0"/>
-              <a:t>–</a:t>
-            </a:r>
-            <a:r>
-              <a:rPr lang="en-US" sz="1600" dirty="0" smtClean="0"/>
-              <a:t> </a:t>
-            </a:r>
-            <a:r>
-              <a:rPr lang="en-US" sz="1600" dirty="0" err="1" smtClean="0"/>
-              <a:t>WebRTC</a:t>
-            </a:r>
-            <a:r>
-              <a:rPr lang="en-US" sz="1600" dirty="0" smtClean="0"/>
-              <a:t> Infrastructure</a:t>
-            </a:r>
-          </a:p>
-          <a:p>
-            <a:pPr lvl="1"/>
-            <a:r>
-              <a:rPr lang="en-US" sz="1400" dirty="0" smtClean="0"/>
-              <a:t>Great overview of </a:t>
-            </a:r>
-            <a:r>
-              <a:rPr lang="en-US" sz="1400" dirty="0" err="1" smtClean="0"/>
-              <a:t>signalling</a:t>
-            </a:r>
-            <a:r>
-              <a:rPr lang="en-US" sz="1400" dirty="0" smtClean="0"/>
-              <a:t> </a:t>
-            </a:r>
-            <a:r>
-              <a:rPr lang="mr-IN" sz="1400" dirty="0" smtClean="0"/>
-              <a:t>–</a:t>
-            </a:r>
-            <a:r>
-              <a:rPr lang="en-US" sz="1400" dirty="0" smtClean="0"/>
-              <a:t> everything you need to know!</a:t>
-            </a:r>
-          </a:p>
-          <a:p>
-            <a:pPr lvl="1"/>
-            <a:r>
-              <a:rPr lang="en-US" sz="1400" dirty="0">
-                <a:hlinkClick r:id="rId6"/>
-              </a:rPr>
-              <a:t>https://www.html5rocks.com/</a:t>
-            </a:r>
-            <a:r>
-              <a:rPr lang="en-US" sz="1400" dirty="0" err="1">
-                <a:hlinkClick r:id="rId6"/>
-              </a:rPr>
-              <a:t>en</a:t>
-            </a:r>
-            <a:r>
-              <a:rPr lang="en-US" sz="1400" dirty="0">
-                <a:hlinkClick r:id="rId6"/>
-              </a:rPr>
-              <a:t>/tutorials/</a:t>
-            </a:r>
-            <a:r>
-              <a:rPr lang="en-US" sz="1400" dirty="0" err="1">
-                <a:hlinkClick r:id="rId6"/>
-              </a:rPr>
-              <a:t>webrtc</a:t>
-            </a:r>
-            <a:r>
-              <a:rPr lang="en-US" sz="1400" dirty="0">
-                <a:hlinkClick r:id="rId6"/>
-              </a:rPr>
-              <a:t>/infrastructure/</a:t>
-            </a:r>
-            <a:endParaRPr lang="en-US" sz="1400" dirty="0"/>
-          </a:p>
-          <a:p>
-            <a:r>
-              <a:rPr lang="en-US" sz="1600" dirty="0" err="1" smtClean="0"/>
-              <a:t>adapter.js</a:t>
-            </a:r>
-            <a:r>
-              <a:rPr lang="en-US" sz="1600" dirty="0" smtClean="0"/>
-              <a:t>: </a:t>
-            </a:r>
-            <a:r>
-              <a:rPr lang="en-US" sz="1400" dirty="0">
-                <a:hlinkClick r:id="rId7"/>
-              </a:rPr>
-              <a:t>https://github.com/webrtc/adapter</a:t>
-            </a:r>
-            <a:endParaRPr lang="en-US" sz="1400" dirty="0"/>
-          </a:p>
-          <a:p>
-            <a:pPr lvl="1"/>
-            <a:r>
-              <a:rPr lang="en-US" sz="1400" dirty="0" smtClean="0"/>
-              <a:t>Shim to isolate applications from browser incompatibilities</a:t>
-            </a:r>
-          </a:p>
-          <a:p>
-            <a:r>
-              <a:rPr lang="en-US" sz="1600" dirty="0"/>
-              <a:t>Promises</a:t>
-            </a:r>
-            <a:r>
-              <a:rPr lang="en-US" sz="1600" dirty="0" smtClean="0"/>
-              <a:t>:</a:t>
-            </a:r>
-          </a:p>
-          <a:p>
-            <a:pPr lvl="1"/>
-            <a:r>
-              <a:rPr lang="en-US" sz="1400" dirty="0">
-                <a:hlinkClick r:id="rId8"/>
-              </a:rPr>
-              <a:t>https://</a:t>
-            </a:r>
-            <a:r>
-              <a:rPr lang="en-US" sz="1400" dirty="0" err="1">
-                <a:hlinkClick r:id="rId8"/>
-              </a:rPr>
-              <a:t>kosamari.com</a:t>
-            </a:r>
-            <a:r>
-              <a:rPr lang="en-US" sz="1400" dirty="0">
-                <a:hlinkClick r:id="rId8"/>
-              </a:rPr>
-              <a:t>/notes/the-promise-of-a-burger-party</a:t>
-            </a:r>
-            <a:endParaRPr lang="en-US" sz="1400" dirty="0"/>
-          </a:p>
-          <a:p>
-            <a:pPr lvl="1"/>
-            <a:r>
-              <a:rPr lang="en-US" sz="1400" dirty="0" smtClean="0">
-                <a:hlinkClick r:id="rId9"/>
-              </a:rPr>
-              <a:t>https</a:t>
-            </a:r>
-            <a:r>
-              <a:rPr lang="en-US" sz="1400" dirty="0">
-                <a:hlinkClick r:id="rId9"/>
-              </a:rPr>
-              <a:t>://</a:t>
-            </a:r>
-            <a:r>
-              <a:rPr lang="en-US" sz="1400" dirty="0" smtClean="0">
-                <a:hlinkClick r:id="rId9"/>
-              </a:rPr>
-              <a:t>developer.mozilla.org/en/docs/Web/JavaScript/Reference/Global_Objects/Promise</a:t>
-            </a:r>
-            <a:endParaRPr lang="en-US" sz="1400" dirty="0" smtClean="0"/>
-          </a:p>
-          <a:p>
-            <a:r>
-              <a:rPr lang="en-US" sz="1600" dirty="0" smtClean="0"/>
-              <a:t>Classes/OOD/OOP: </a:t>
-            </a:r>
-            <a:r>
-              <a:rPr lang="en-US" sz="1400" dirty="0" smtClean="0">
-                <a:hlinkClick r:id="rId10"/>
-              </a:rPr>
-              <a:t>https</a:t>
-            </a:r>
-            <a:r>
-              <a:rPr lang="en-US" sz="1400" dirty="0">
-                <a:hlinkClick r:id="rId10"/>
-              </a:rPr>
-              <a:t>://</a:t>
-            </a:r>
-            <a:r>
-              <a:rPr lang="en-US" sz="1400" dirty="0" smtClean="0">
-                <a:hlinkClick r:id="rId10"/>
-              </a:rPr>
-              <a:t>developer.mozilla.org/en-US/docs/Learn/JavaScript/Objects/Object-oriented_JS</a:t>
-            </a:r>
-            <a:endParaRPr lang="en-US" sz="1400" dirty="0" smtClean="0"/>
-          </a:p>
-          <a:p>
-            <a:r>
-              <a:rPr lang="en-US" sz="1600" dirty="0" smtClean="0"/>
-              <a:t>Finite State Machine: </a:t>
-            </a:r>
-            <a:r>
-              <a:rPr lang="en-US" sz="1400" dirty="0" smtClean="0">
-                <a:hlinkClick r:id="rId11"/>
-              </a:rPr>
-              <a:t>https://developer.mozilla.org/en-US/docs/Glossary/State_machine</a:t>
-            </a:r>
-            <a:endParaRPr lang="en-US" sz="1400" dirty="0" smtClean="0"/>
-          </a:p>
-          <a:p>
-            <a:endParaRPr lang="en-US" sz="1600" dirty="0"/>
-          </a:p>
-        </p:txBody>
-      </p:sp>
-    </p:spTree>
-    <p:extLst>
-      <p:ext uri="{BB962C8B-B14F-4D97-AF65-F5344CB8AC3E}">
-        <p14:creationId xmlns:p14="http://schemas.microsoft.com/office/powerpoint/2010/main" val="162938005"/>
-      </p:ext>
-    </p:extLst>
-  </p:cSld>
-  <p:clrMapOvr>
-    <a:masterClrMapping/>
-  </p:clrMapOvr>
-  <p:timing>
-    <p:tnLst>
-      <p:par>
-        <p:cTn id="1" dur="indefinite" restart="never" nodeType="tmRoot"/>
-      </p:par>
-    </p:tnLst>
-  </p:timing>
-</p:sld>
-</file>
-
 <file path=ppt/slides/slide4.xml><?xml version="1.0" encoding="utf-8"?>
 <p:sld xmlns:a="http://schemas.openxmlformats.org/drawingml/2006/main" xmlns:r="http://schemas.openxmlformats.org/officeDocument/2006/relationships" xmlns:p="http://schemas.openxmlformats.org/presentationml/2006/main">
   <p:cSld>
@@ -16224,6 +16447,576 @@
       </p:grpSpPr>
       <p:sp>
         <p:nvSpPr>
+          <p:cNvPr id="2" name="Title 1"/>
+          <p:cNvSpPr>
+            <a:spLocks noGrp="1"/>
+          </p:cNvSpPr>
+          <p:nvPr>
+            <p:ph type="title"/>
+          </p:nvPr>
+        </p:nvSpPr>
+        <p:spPr/>
+        <p:txBody>
+          <a:bodyPr>
+            <a:normAutofit/>
+          </a:bodyPr>
+          <a:lstStyle/>
+          <a:p>
+            <a:r>
+              <a:rPr lang="en-US" sz="4000" dirty="0" err="1" smtClean="0"/>
+              <a:t>Signalling</a:t>
+            </a:r>
+            <a:r>
+              <a:rPr lang="en-US" sz="4000" dirty="0" smtClean="0"/>
+              <a:t> for Remote Presentations: Two Options</a:t>
+            </a:r>
+            <a:endParaRPr lang="en-US" sz="4000" dirty="0"/>
+          </a:p>
+        </p:txBody>
+      </p:sp>
+      <p:sp>
+        <p:nvSpPr>
+          <p:cNvPr id="3" name="Content Placeholder 2"/>
+          <p:cNvSpPr>
+            <a:spLocks noGrp="1"/>
+          </p:cNvSpPr>
+          <p:nvPr>
+            <p:ph idx="1"/>
+          </p:nvPr>
+        </p:nvSpPr>
+        <p:spPr/>
+        <p:txBody>
+          <a:bodyPr/>
+          <a:lstStyle/>
+          <a:p>
+            <a:r>
+              <a:rPr lang="en-US" dirty="0" smtClean="0"/>
+              <a:t>Evolution of simple </a:t>
+            </a:r>
+            <a:r>
+              <a:rPr lang="en-US" dirty="0" err="1" smtClean="0"/>
+              <a:t>signalling</a:t>
+            </a:r>
+            <a:r>
+              <a:rPr lang="en-US" dirty="0" smtClean="0"/>
+              <a:t> from previous example</a:t>
+            </a:r>
+          </a:p>
+          <a:p>
+            <a:pPr lvl="1"/>
+            <a:r>
+              <a:rPr lang="en-US" dirty="0" smtClean="0"/>
+              <a:t>Should work on a local LAN</a:t>
+            </a:r>
+          </a:p>
+          <a:p>
+            <a:pPr lvl="1"/>
+            <a:r>
+              <a:rPr lang="en-US" dirty="0" smtClean="0"/>
+              <a:t>Won’t work across the Internet without TURN/STUN servers (complexity)</a:t>
+            </a:r>
+          </a:p>
+          <a:p>
+            <a:r>
+              <a:rPr lang="en-US" dirty="0" err="1" smtClean="0"/>
+              <a:t>IPCortex</a:t>
+            </a:r>
+            <a:r>
+              <a:rPr lang="en-US" dirty="0" smtClean="0"/>
+              <a:t> API</a:t>
+            </a:r>
+          </a:p>
+          <a:p>
+            <a:pPr lvl="1"/>
+            <a:r>
+              <a:rPr lang="en-US" dirty="0" smtClean="0"/>
+              <a:t>Covers all the routing across the Internet</a:t>
+            </a:r>
+          </a:p>
+          <a:p>
+            <a:pPr lvl="1"/>
+            <a:r>
+              <a:rPr lang="en-US" dirty="0" smtClean="0"/>
+              <a:t>More complex to configure/run</a:t>
+            </a:r>
+          </a:p>
+          <a:p>
+            <a:endParaRPr lang="en-US" dirty="0"/>
+          </a:p>
+        </p:txBody>
+      </p:sp>
+    </p:spTree>
+    <p:extLst>
+      <p:ext uri="{BB962C8B-B14F-4D97-AF65-F5344CB8AC3E}">
+        <p14:creationId xmlns:p14="http://schemas.microsoft.com/office/powerpoint/2010/main" val="814445932"/>
+      </p:ext>
+    </p:extLst>
+  </p:cSld>
+  <p:clrMapOvr>
+    <a:masterClrMapping/>
+  </p:clrMapOvr>
+  <mc:AlternateContent xmlns:mc="http://schemas.openxmlformats.org/markup-compatibility/2006">
+    <mc:Choice xmlns:p14="http://schemas.microsoft.com/office/powerpoint/2010/main" Requires="p14">
+      <p:transition spd="slow" p14:dur="2000"/>
+    </mc:Choice>
+    <mc:Fallback>
+      <p:transition spd="slow"/>
+    </mc:Fallback>
+  </mc:AlternateContent>
+  <p:timing>
+    <p:tnLst>
+      <p:par>
+        <p:cTn id="1" dur="indefinite" restart="never" nodeType="tmRoot"/>
+      </p:par>
+    </p:tnLst>
+  </p:timing>
+</p:sld>
+</file>
+
+<file path=ppt/slides/slide41.xml><?xml version="1.0" encoding="utf-8"?>
+<p:sld xmlns:a="http://schemas.openxmlformats.org/drawingml/2006/main" xmlns:r="http://schemas.openxmlformats.org/officeDocument/2006/relationships" xmlns:p="http://schemas.openxmlformats.org/presentationml/2006/main">
+  <p:cSld>
+    <p:spTree>
+      <p:nvGrpSpPr>
+        <p:cNvPr id="1" name=""/>
+        <p:cNvGrpSpPr/>
+        <p:nvPr/>
+      </p:nvGrpSpPr>
+      <p:grpSpPr>
+        <a:xfrm>
+          <a:off x="0" y="0"/>
+          <a:ext cx="0" cy="0"/>
+          <a:chOff x="0" y="0"/>
+          <a:chExt cx="0" cy="0"/>
+        </a:xfrm>
+      </p:grpSpPr>
+      <p:sp>
+        <p:nvSpPr>
+          <p:cNvPr id="2" name="Title 1"/>
+          <p:cNvSpPr>
+            <a:spLocks noGrp="1"/>
+          </p:cNvSpPr>
+          <p:nvPr>
+            <p:ph type="title"/>
+          </p:nvPr>
+        </p:nvSpPr>
+        <p:spPr/>
+        <p:txBody>
+          <a:bodyPr/>
+          <a:lstStyle/>
+          <a:p>
+            <a:r>
+              <a:rPr lang="en-US" dirty="0" smtClean="0"/>
+              <a:t>References</a:t>
+            </a:r>
+            <a:endParaRPr lang="en-US" dirty="0"/>
+          </a:p>
+        </p:txBody>
+      </p:sp>
+      <p:sp>
+        <p:nvSpPr>
+          <p:cNvPr id="3" name="Content Placeholder 2"/>
+          <p:cNvSpPr>
+            <a:spLocks noGrp="1"/>
+          </p:cNvSpPr>
+          <p:nvPr>
+            <p:ph idx="1"/>
+          </p:nvPr>
+        </p:nvSpPr>
+        <p:spPr>
+          <a:xfrm>
+            <a:off x="838200" y="1409700"/>
+            <a:ext cx="10515600" cy="5168900"/>
+          </a:xfrm>
+        </p:spPr>
+        <p:txBody>
+          <a:bodyPr>
+            <a:normAutofit fontScale="92500" lnSpcReduction="10000"/>
+          </a:bodyPr>
+          <a:lstStyle/>
+          <a:p>
+            <a:r>
+              <a:rPr lang="en-US" sz="1600" dirty="0" err="1" smtClean="0"/>
+              <a:t>mediaDevices.getUserMedia</a:t>
+            </a:r>
+            <a:r>
+              <a:rPr lang="en-US" sz="1600" dirty="0" smtClean="0"/>
+              <a:t> MDN:</a:t>
+            </a:r>
+          </a:p>
+          <a:p>
+            <a:pPr lvl="1"/>
+            <a:r>
+              <a:rPr lang="en-US" sz="1500" dirty="0" smtClean="0">
+                <a:hlinkClick r:id="rId2"/>
+              </a:rPr>
+              <a:t>https</a:t>
+            </a:r>
+            <a:r>
+              <a:rPr lang="en-US" sz="1500" dirty="0">
+                <a:hlinkClick r:id="rId2"/>
+              </a:rPr>
+              <a:t>://</a:t>
+            </a:r>
+            <a:r>
+              <a:rPr lang="en-US" sz="1400" dirty="0">
+                <a:hlinkClick r:id="rId2"/>
+              </a:rPr>
+              <a:t>developer.mozilla.org/en-US/docs/Web/API/MediaDevices/getUserMedia</a:t>
+            </a:r>
+            <a:endParaRPr lang="en-US" sz="1400" dirty="0" smtClean="0"/>
+          </a:p>
+          <a:p>
+            <a:r>
+              <a:rPr lang="en-US" sz="1600" dirty="0" err="1" smtClean="0"/>
+              <a:t>WebRTC</a:t>
+            </a:r>
+            <a:endParaRPr lang="en-US" sz="1600" dirty="0"/>
+          </a:p>
+          <a:p>
+            <a:pPr lvl="1"/>
+            <a:r>
+              <a:rPr lang="en-US" sz="1400" dirty="0" smtClean="0">
+                <a:hlinkClick r:id="rId3"/>
+              </a:rPr>
+              <a:t>https://developer.mozilla.org/en-US/docs/Web/API/WebRTC_API</a:t>
+            </a:r>
+            <a:endParaRPr lang="en-US" sz="1400" dirty="0" smtClean="0"/>
+          </a:p>
+          <a:p>
+            <a:r>
+              <a:rPr lang="en-US" sz="1600" dirty="0" err="1" smtClean="0"/>
+              <a:t>WebRTC.org</a:t>
+            </a:r>
+            <a:r>
+              <a:rPr lang="en-US" sz="1600" dirty="0" smtClean="0"/>
+              <a:t> </a:t>
+            </a:r>
+            <a:r>
+              <a:rPr lang="mr-IN" sz="1600" dirty="0" smtClean="0"/>
+              <a:t>–</a:t>
+            </a:r>
+            <a:r>
+              <a:rPr lang="en-US" sz="1600" dirty="0" smtClean="0"/>
+              <a:t> Getting Started</a:t>
+            </a:r>
+          </a:p>
+          <a:p>
+            <a:pPr lvl="1"/>
+            <a:r>
+              <a:rPr lang="en-US" sz="1400" dirty="0" smtClean="0">
+                <a:hlinkClick r:id="rId4"/>
+              </a:rPr>
+              <a:t>https://</a:t>
+            </a:r>
+            <a:r>
+              <a:rPr lang="en-US" sz="1400" dirty="0" err="1" smtClean="0">
+                <a:hlinkClick r:id="rId4"/>
+              </a:rPr>
+              <a:t>webrtc.org</a:t>
+            </a:r>
+            <a:r>
+              <a:rPr lang="en-US" sz="1400" dirty="0" smtClean="0">
+                <a:hlinkClick r:id="rId4"/>
+              </a:rPr>
+              <a:t>/start/</a:t>
+            </a:r>
+            <a:endParaRPr lang="en-US" sz="1400" dirty="0" smtClean="0"/>
+          </a:p>
+          <a:p>
+            <a:r>
+              <a:rPr lang="en-US" sz="1600" dirty="0" smtClean="0"/>
+              <a:t>HTML 5 Rocks </a:t>
+            </a:r>
+            <a:r>
+              <a:rPr lang="mr-IN" sz="1600" dirty="0" smtClean="0"/>
+              <a:t>–</a:t>
+            </a:r>
+            <a:r>
+              <a:rPr lang="en-US" sz="1600" dirty="0" smtClean="0"/>
+              <a:t> Getting started with </a:t>
+            </a:r>
+            <a:r>
+              <a:rPr lang="en-US" sz="1600" dirty="0" err="1" smtClean="0"/>
+              <a:t>WebRTC</a:t>
+            </a:r>
+            <a:r>
+              <a:rPr lang="en-US" sz="1600" dirty="0" smtClean="0"/>
+              <a:t> (2012)</a:t>
+            </a:r>
+          </a:p>
+          <a:p>
+            <a:pPr lvl="1"/>
+            <a:r>
+              <a:rPr lang="en-US" sz="1400" dirty="0" smtClean="0"/>
+              <a:t>Illustrates local </a:t>
+            </a:r>
+            <a:r>
+              <a:rPr lang="en-US" sz="1400" dirty="0" err="1" smtClean="0"/>
+              <a:t>signalling</a:t>
+            </a:r>
+            <a:r>
+              <a:rPr lang="en-US" sz="1400" dirty="0" smtClean="0"/>
+              <a:t> </a:t>
+            </a:r>
+            <a:r>
+              <a:rPr lang="en-US" sz="1400" i="1" dirty="0" smtClean="0"/>
+              <a:t>but</a:t>
+            </a:r>
+            <a:r>
+              <a:rPr lang="en-US" sz="1400" dirty="0" smtClean="0"/>
+              <a:t> not is a portable way</a:t>
+            </a:r>
+          </a:p>
+          <a:p>
+            <a:pPr lvl="1"/>
+            <a:r>
+              <a:rPr lang="en-US" sz="1400" dirty="0" smtClean="0">
+                <a:hlinkClick r:id="rId5"/>
+              </a:rPr>
+              <a:t>https://www.html5rocks.com/en/tutorials/webrtc/basics/</a:t>
+            </a:r>
+            <a:endParaRPr lang="en-US" sz="1400" dirty="0" smtClean="0"/>
+          </a:p>
+          <a:p>
+            <a:r>
+              <a:rPr lang="en-US" sz="1600" dirty="0" smtClean="0"/>
+              <a:t>HTML 5 Rocks </a:t>
+            </a:r>
+            <a:r>
+              <a:rPr lang="mr-IN" sz="1600" dirty="0" smtClean="0"/>
+              <a:t>–</a:t>
+            </a:r>
+            <a:r>
+              <a:rPr lang="en-US" sz="1600" dirty="0" smtClean="0"/>
+              <a:t> </a:t>
+            </a:r>
+            <a:r>
+              <a:rPr lang="en-US" sz="1600" dirty="0" err="1" smtClean="0"/>
+              <a:t>WebRTC</a:t>
+            </a:r>
+            <a:r>
+              <a:rPr lang="en-US" sz="1600" dirty="0" smtClean="0"/>
+              <a:t> Infrastructure</a:t>
+            </a:r>
+          </a:p>
+          <a:p>
+            <a:pPr lvl="1"/>
+            <a:r>
+              <a:rPr lang="en-US" sz="1400" dirty="0" smtClean="0"/>
+              <a:t>Great overview of </a:t>
+            </a:r>
+            <a:r>
+              <a:rPr lang="en-US" sz="1400" dirty="0" err="1" smtClean="0"/>
+              <a:t>signalling</a:t>
+            </a:r>
+            <a:r>
+              <a:rPr lang="en-US" sz="1400" dirty="0" smtClean="0"/>
+              <a:t> </a:t>
+            </a:r>
+            <a:r>
+              <a:rPr lang="mr-IN" sz="1400" dirty="0" smtClean="0"/>
+              <a:t>–</a:t>
+            </a:r>
+            <a:r>
+              <a:rPr lang="en-US" sz="1400" dirty="0" smtClean="0"/>
+              <a:t> everything you need to know!</a:t>
+            </a:r>
+          </a:p>
+          <a:p>
+            <a:pPr lvl="1"/>
+            <a:r>
+              <a:rPr lang="en-US" sz="1400" dirty="0">
+                <a:hlinkClick r:id="rId6"/>
+              </a:rPr>
+              <a:t>https://www.html5rocks.com/</a:t>
+            </a:r>
+            <a:r>
+              <a:rPr lang="en-US" sz="1400" dirty="0" err="1">
+                <a:hlinkClick r:id="rId6"/>
+              </a:rPr>
+              <a:t>en</a:t>
+            </a:r>
+            <a:r>
+              <a:rPr lang="en-US" sz="1400" dirty="0">
+                <a:hlinkClick r:id="rId6"/>
+              </a:rPr>
+              <a:t>/tutorials/</a:t>
+            </a:r>
+            <a:r>
+              <a:rPr lang="en-US" sz="1400" dirty="0" err="1">
+                <a:hlinkClick r:id="rId6"/>
+              </a:rPr>
+              <a:t>webrtc</a:t>
+            </a:r>
+            <a:r>
+              <a:rPr lang="en-US" sz="1400" dirty="0">
+                <a:hlinkClick r:id="rId6"/>
+              </a:rPr>
+              <a:t>/infrastructure/</a:t>
+            </a:r>
+            <a:endParaRPr lang="en-US" sz="1400" dirty="0"/>
+          </a:p>
+          <a:p>
+            <a:r>
+              <a:rPr lang="en-US" sz="1600" dirty="0" err="1" smtClean="0"/>
+              <a:t>adapter.js</a:t>
+            </a:r>
+            <a:r>
+              <a:rPr lang="en-US" sz="1600" dirty="0" smtClean="0"/>
+              <a:t>: </a:t>
+            </a:r>
+            <a:r>
+              <a:rPr lang="en-US" sz="1400" dirty="0">
+                <a:hlinkClick r:id="rId7"/>
+              </a:rPr>
+              <a:t>https://github.com/webrtc/adapter</a:t>
+            </a:r>
+            <a:endParaRPr lang="en-US" sz="1400" dirty="0"/>
+          </a:p>
+          <a:p>
+            <a:pPr lvl="1"/>
+            <a:r>
+              <a:rPr lang="en-US" sz="1400" dirty="0" smtClean="0"/>
+              <a:t>Shim to isolate applications from browser incompatibilities</a:t>
+            </a:r>
+          </a:p>
+          <a:p>
+            <a:r>
+              <a:rPr lang="en-US" sz="1600" dirty="0"/>
+              <a:t>Promises</a:t>
+            </a:r>
+            <a:r>
+              <a:rPr lang="en-US" sz="1600" dirty="0" smtClean="0"/>
+              <a:t>:</a:t>
+            </a:r>
+          </a:p>
+          <a:p>
+            <a:pPr lvl="1"/>
+            <a:r>
+              <a:rPr lang="en-US" sz="1400" dirty="0">
+                <a:hlinkClick r:id="rId8"/>
+              </a:rPr>
+              <a:t>https://</a:t>
+            </a:r>
+            <a:r>
+              <a:rPr lang="en-US" sz="1400" dirty="0" err="1">
+                <a:hlinkClick r:id="rId8"/>
+              </a:rPr>
+              <a:t>kosamari.com</a:t>
+            </a:r>
+            <a:r>
+              <a:rPr lang="en-US" sz="1400" dirty="0">
+                <a:hlinkClick r:id="rId8"/>
+              </a:rPr>
+              <a:t>/notes/the-promise-of-a-burger-party</a:t>
+            </a:r>
+            <a:endParaRPr lang="en-US" sz="1400" dirty="0"/>
+          </a:p>
+          <a:p>
+            <a:pPr lvl="1"/>
+            <a:r>
+              <a:rPr lang="en-US" sz="1400" dirty="0" smtClean="0">
+                <a:hlinkClick r:id="rId9"/>
+              </a:rPr>
+              <a:t>https</a:t>
+            </a:r>
+            <a:r>
+              <a:rPr lang="en-US" sz="1400" dirty="0">
+                <a:hlinkClick r:id="rId9"/>
+              </a:rPr>
+              <a:t>://</a:t>
+            </a:r>
+            <a:r>
+              <a:rPr lang="en-US" sz="1400" dirty="0" smtClean="0">
+                <a:hlinkClick r:id="rId9"/>
+              </a:rPr>
+              <a:t>developer.mozilla.org/en/docs/Web/JavaScript/Reference/Global_Objects/Promise</a:t>
+            </a:r>
+            <a:endParaRPr lang="en-US" sz="1400" dirty="0" smtClean="0"/>
+          </a:p>
+          <a:p>
+            <a:r>
+              <a:rPr lang="en-US" sz="1600" dirty="0" smtClean="0"/>
+              <a:t>Classes/OOD/OOP: </a:t>
+            </a:r>
+            <a:r>
+              <a:rPr lang="en-US" sz="1400" dirty="0" smtClean="0">
+                <a:hlinkClick r:id="rId10"/>
+              </a:rPr>
+              <a:t>https</a:t>
+            </a:r>
+            <a:r>
+              <a:rPr lang="en-US" sz="1400" dirty="0">
+                <a:hlinkClick r:id="rId10"/>
+              </a:rPr>
+              <a:t>://</a:t>
+            </a:r>
+            <a:r>
+              <a:rPr lang="en-US" sz="1400" dirty="0" smtClean="0">
+                <a:hlinkClick r:id="rId10"/>
+              </a:rPr>
+              <a:t>developer.mozilla.org/en-US/docs/Learn/JavaScript/Objects/Object-oriented_JS</a:t>
+            </a:r>
+            <a:endParaRPr lang="en-US" sz="1400" dirty="0" smtClean="0"/>
+          </a:p>
+          <a:p>
+            <a:r>
+              <a:rPr lang="en-US" sz="1600" dirty="0" smtClean="0"/>
+              <a:t>Finite State Machine: </a:t>
+            </a:r>
+            <a:r>
+              <a:rPr lang="en-US" sz="1400" dirty="0" smtClean="0">
+                <a:hlinkClick r:id="rId11"/>
+              </a:rPr>
+              <a:t>https://developer.mozilla.org/en-US/docs/Glossary/State_machine</a:t>
+            </a:r>
+            <a:endParaRPr lang="en-US" sz="1400" dirty="0" smtClean="0"/>
+          </a:p>
+          <a:p>
+            <a:endParaRPr lang="en-US" sz="1600" dirty="0"/>
+          </a:p>
+        </p:txBody>
+      </p:sp>
+    </p:spTree>
+    <p:extLst>
+      <p:ext uri="{BB962C8B-B14F-4D97-AF65-F5344CB8AC3E}">
+        <p14:creationId xmlns:p14="http://schemas.microsoft.com/office/powerpoint/2010/main" val="162938005"/>
+      </p:ext>
+    </p:extLst>
+  </p:cSld>
+  <p:clrMapOvr>
+    <a:masterClrMapping/>
+  </p:clrMapOvr>
+  <p:timing>
+    <p:tnLst>
+      <p:par>
+        <p:cTn id="1" dur="indefinite" restart="never" nodeType="tmRoot"/>
+      </p:par>
+    </p:tnLst>
+  </p:timing>
+</p:sld>
+</file>
+
+<file path=ppt/slides/slide42.xml><?xml version="1.0" encoding="utf-8"?>
+<p:sld xmlns:a="http://schemas.openxmlformats.org/drawingml/2006/main" xmlns:r="http://schemas.openxmlformats.org/officeDocument/2006/relationships" xmlns:p="http://schemas.openxmlformats.org/presentationml/2006/main" show="0">
+  <p:cSld>
+    <p:spTree>
+      <p:nvGrpSpPr>
+        <p:cNvPr id="1" name=""/>
+        <p:cNvGrpSpPr/>
+        <p:nvPr/>
+      </p:nvGrpSpPr>
+      <p:grpSpPr>
+        <a:xfrm>
+          <a:off x="0" y="0"/>
+          <a:ext cx="0" cy="0"/>
+          <a:chOff x="0" y="0"/>
+          <a:chExt cx="0" cy="0"/>
+        </a:xfrm>
+      </p:grpSpPr>
+      <p:sp>
+        <p:nvSpPr>
           <p:cNvPr id="3" name="Content Placeholder 2"/>
           <p:cNvSpPr>
             <a:spLocks noGrp="1"/>
@@ -16326,7 +17119,7 @@
 </p:sld>
 </file>
 
-<file path=ppt/slides/slide41.xml><?xml version="1.0" encoding="utf-8"?>
+<file path=ppt/slides/slide43.xml><?xml version="1.0" encoding="utf-8"?>
 <p:sld xmlns:a="http://schemas.openxmlformats.org/drawingml/2006/main" xmlns:r="http://schemas.openxmlformats.org/officeDocument/2006/relationships" xmlns:p="http://schemas.openxmlformats.org/presentationml/2006/main" show="0">
   <p:cSld>
     <p:spTree>
@@ -17513,7 +18306,7 @@
 </p:sld>
 </file>
 
-<file path=ppt/slides/slide42.xml><?xml version="1.0" encoding="utf-8"?>
+<file path=ppt/slides/slide44.xml><?xml version="1.0" encoding="utf-8"?>
 <p:sld xmlns:a="http://schemas.openxmlformats.org/drawingml/2006/main" xmlns:r="http://schemas.openxmlformats.org/officeDocument/2006/relationships" xmlns:p="http://schemas.openxmlformats.org/presentationml/2006/main" show="0">
   <p:cSld>
     <p:spTree>

</xml_diff>